<commit_message>
night two lecture and reading materials
</commit_message>
<xml_diff>
--- a/lectures/01 - CPSC-5100.pptx
+++ b/lectures/01 - CPSC-5100.pptx
@@ -141,6 +141,30 @@
 
 <file path=ppt/changesInfos/changesInfo1.xml><?xml version="1.0" encoding="utf-8"?>
 <pc:chgInfo xmlns:a="http://schemas.openxmlformats.org/drawingml/2006/main" xmlns:r="http://schemas.openxmlformats.org/officeDocument/2006/relationships" xmlns:ac="http://schemas.microsoft.com/office/drawing/2013/main/command" xmlns:pc="http://schemas.microsoft.com/office/powerpoint/2013/main/command">
+  <pc:docChgLst>
+    <pc:chgData name="Michaeljon Miller" userId="c575fe5cddd8b8cf" providerId="LiveId" clId="{98347C28-2957-534B-A443-21BDF85E0E94}"/>
+    <pc:docChg chg="custSel modSld">
+      <pc:chgData name="Michaeljon Miller" userId="c575fe5cddd8b8cf" providerId="LiveId" clId="{98347C28-2957-534B-A443-21BDF85E0E94}" dt="2018-09-27T00:48:20.588" v="14" actId="20577"/>
+      <pc:docMkLst>
+        <pc:docMk/>
+      </pc:docMkLst>
+      <pc:sldChg chg="modSp">
+        <pc:chgData name="Michaeljon Miller" userId="c575fe5cddd8b8cf" providerId="LiveId" clId="{98347C28-2957-534B-A443-21BDF85E0E94}" dt="2018-09-27T00:48:20.588" v="14" actId="20577"/>
+        <pc:sldMkLst>
+          <pc:docMk/>
+          <pc:sldMk cId="1096853142" sldId="256"/>
+        </pc:sldMkLst>
+        <pc:spChg chg="mod">
+          <ac:chgData name="Michaeljon Miller" userId="c575fe5cddd8b8cf" providerId="LiveId" clId="{98347C28-2957-534B-A443-21BDF85E0E94}" dt="2018-09-27T00:48:20.588" v="14" actId="20577"/>
+          <ac:spMkLst>
+            <pc:docMk/>
+            <pc:sldMk cId="1096853142" sldId="256"/>
+            <ac:spMk id="3" creationId="{00000000-0000-0000-0000-000000000000}"/>
+          </ac:spMkLst>
+        </pc:spChg>
+      </pc:sldChg>
+    </pc:docChg>
+  </pc:docChgLst>
   <pc:docChgLst>
     <pc:chgData name="Michaeljon Miller" userId="c575fe5cddd8b8cf" providerId="LiveId" clId="{FE12F23A-CD05-044A-8708-FACD3091E338}"/>
     <pc:docChg chg="undo custSel addSld delSld modSld">
@@ -4254,8 +4278,13 @@
           <a:p>
             <a:r>
               <a:rPr lang="en-US" dirty="0"/>
-              <a:t>Sept 26 - Introduction</a:t>
-            </a:r>
+              <a:t>Sept 26 – Introduction </a:t>
+            </a:r>
+            <a:r>
+              <a:rPr lang="en-US"/>
+              <a:t>and stuff</a:t>
+            </a:r>
+            <a:endParaRPr lang="en-US" dirty="0"/>
           </a:p>
         </p:txBody>
       </p:sp>

</xml_diff>